<commit_message>
Add add and remove logic to CartItem and Reducer
</commit_message>
<xml_diff>
--- a/Software Architecture.pptx
+++ b/Software Architecture.pptx
@@ -261,7 +261,7 @@
           <a:p>
             <a:fld id="{D79E692B-1602-314B-B101-4E41C00C374D}" type="datetimeFigureOut">
               <a:rPr lang="en-NL" smtClean="0"/>
-              <a:t>05/06/2023</a:t>
+              <a:t>06/06/2023</a:t>
             </a:fld>
             <a:endParaRPr lang="en-NL"/>
           </a:p>
@@ -461,7 +461,7 @@
           <a:p>
             <a:fld id="{D79E692B-1602-314B-B101-4E41C00C374D}" type="datetimeFigureOut">
               <a:rPr lang="en-NL" smtClean="0"/>
-              <a:t>05/06/2023</a:t>
+              <a:t>06/06/2023</a:t>
             </a:fld>
             <a:endParaRPr lang="en-NL"/>
           </a:p>
@@ -671,7 +671,7 @@
           <a:p>
             <a:fld id="{D79E692B-1602-314B-B101-4E41C00C374D}" type="datetimeFigureOut">
               <a:rPr lang="en-NL" smtClean="0"/>
-              <a:t>05/06/2023</a:t>
+              <a:t>06/06/2023</a:t>
             </a:fld>
             <a:endParaRPr lang="en-NL"/>
           </a:p>
@@ -871,7 +871,7 @@
           <a:p>
             <a:fld id="{D79E692B-1602-314B-B101-4E41C00C374D}" type="datetimeFigureOut">
               <a:rPr lang="en-NL" smtClean="0"/>
-              <a:t>05/06/2023</a:t>
+              <a:t>06/06/2023</a:t>
             </a:fld>
             <a:endParaRPr lang="en-NL"/>
           </a:p>
@@ -1147,7 +1147,7 @@
           <a:p>
             <a:fld id="{D79E692B-1602-314B-B101-4E41C00C374D}" type="datetimeFigureOut">
               <a:rPr lang="en-NL" smtClean="0"/>
-              <a:t>05/06/2023</a:t>
+              <a:t>06/06/2023</a:t>
             </a:fld>
             <a:endParaRPr lang="en-NL"/>
           </a:p>
@@ -1415,7 +1415,7 @@
           <a:p>
             <a:fld id="{D79E692B-1602-314B-B101-4E41C00C374D}" type="datetimeFigureOut">
               <a:rPr lang="en-NL" smtClean="0"/>
-              <a:t>05/06/2023</a:t>
+              <a:t>06/06/2023</a:t>
             </a:fld>
             <a:endParaRPr lang="en-NL"/>
           </a:p>
@@ -1830,7 +1830,7 @@
           <a:p>
             <a:fld id="{D79E692B-1602-314B-B101-4E41C00C374D}" type="datetimeFigureOut">
               <a:rPr lang="en-NL" smtClean="0"/>
-              <a:t>05/06/2023</a:t>
+              <a:t>06/06/2023</a:t>
             </a:fld>
             <a:endParaRPr lang="en-NL"/>
           </a:p>
@@ -1972,7 +1972,7 @@
           <a:p>
             <a:fld id="{D79E692B-1602-314B-B101-4E41C00C374D}" type="datetimeFigureOut">
               <a:rPr lang="en-NL" smtClean="0"/>
-              <a:t>05/06/2023</a:t>
+              <a:t>06/06/2023</a:t>
             </a:fld>
             <a:endParaRPr lang="en-NL"/>
           </a:p>
@@ -2085,7 +2085,7 @@
           <a:p>
             <a:fld id="{D79E692B-1602-314B-B101-4E41C00C374D}" type="datetimeFigureOut">
               <a:rPr lang="en-NL" smtClean="0"/>
-              <a:t>05/06/2023</a:t>
+              <a:t>06/06/2023</a:t>
             </a:fld>
             <a:endParaRPr lang="en-NL"/>
           </a:p>
@@ -2398,7 +2398,7 @@
           <a:p>
             <a:fld id="{D79E692B-1602-314B-B101-4E41C00C374D}" type="datetimeFigureOut">
               <a:rPr lang="en-NL" smtClean="0"/>
-              <a:t>05/06/2023</a:t>
+              <a:t>06/06/2023</a:t>
             </a:fld>
             <a:endParaRPr lang="en-NL"/>
           </a:p>
@@ -2687,7 +2687,7 @@
           <a:p>
             <a:fld id="{D79E692B-1602-314B-B101-4E41C00C374D}" type="datetimeFigureOut">
               <a:rPr lang="en-NL" smtClean="0"/>
-              <a:t>05/06/2023</a:t>
+              <a:t>06/06/2023</a:t>
             </a:fld>
             <a:endParaRPr lang="en-NL"/>
           </a:p>
@@ -2930,7 +2930,7 @@
           <a:p>
             <a:fld id="{D79E692B-1602-314B-B101-4E41C00C374D}" type="datetimeFigureOut">
               <a:rPr lang="en-NL" smtClean="0"/>
-              <a:t>05/06/2023</a:t>
+              <a:t>06/06/2023</a:t>
             </a:fld>
             <a:endParaRPr lang="en-NL"/>
           </a:p>
@@ -4420,7 +4420,7 @@
         <p:spPr>
           <a:xfrm>
             <a:off x="1243064" y="2713975"/>
-            <a:ext cx="280846" cy="246221"/>
+            <a:ext cx="1800493" cy="246221"/>
           </a:xfrm>
           <a:prstGeom prst="rect">
             <a:avLst/>
@@ -4441,12 +4441,20 @@
           <a:bodyPr wrap="none" rtlCol="0">
             <a:spAutoFit/>
           </a:bodyPr>
-          <a:lstStyle/>
-          <a:p>
-            <a:r>
-              <a:rPr lang="en-NL" sz="1000" dirty="0"/>
-              <a:t>…</a:t>
-            </a:r>
+          <a:lstStyle>
+            <a:defPPr>
+              <a:defRPr lang="en-NL"/>
+            </a:defPPr>
+            <a:lvl1pPr>
+              <a:defRPr sz="1000"/>
+            </a:lvl1pPr>
+          </a:lstStyle>
+          <a:p>
+            <a:r>
+              <a:rPr lang="en-GB" dirty="0" err="1"/>
+              <a:t>cartItemRemoveHandler</a:t>
+            </a:r>
+            <a:endParaRPr lang="en-GB" dirty="0"/>
           </a:p>
         </p:txBody>
       </p:sp>
@@ -4465,7 +4473,7 @@
         <p:spPr>
           <a:xfrm>
             <a:off x="1243064" y="3061857"/>
-            <a:ext cx="280846" cy="246221"/>
+            <a:ext cx="1252266" cy="246221"/>
           </a:xfrm>
           <a:prstGeom prst="rect">
             <a:avLst/>
@@ -4489,9 +4497,10 @@
           <a:lstStyle/>
           <a:p>
             <a:r>
-              <a:rPr lang="en-NL" sz="1000" dirty="0"/>
-              <a:t>…</a:t>
-            </a:r>
+              <a:rPr lang="en-GB" sz="1000" dirty="0" err="1"/>
+              <a:t>cartItemAddHandler</a:t>
+            </a:r>
+            <a:endParaRPr lang="en-GB" sz="1000" dirty="0"/>
           </a:p>
         </p:txBody>
       </p:sp>
@@ -4555,7 +4564,7 @@
         <p:spPr>
           <a:xfrm>
             <a:off x="444095" y="2841065"/>
-            <a:ext cx="608925" cy="553998"/>
+            <a:ext cx="608925" cy="246221"/>
           </a:xfrm>
           <a:prstGeom prst="rect">
             <a:avLst/>
@@ -4570,7 +4579,7 @@
           <a:p>
             <a:r>
               <a:rPr lang="en-NL" sz="1000" dirty="0"/>
-              <a:t>Trigger and read</a:t>
+              <a:t>read</a:t>
             </a:r>
           </a:p>
         </p:txBody>
@@ -5170,36 +5179,6 @@
           </a:p>
         </p:txBody>
       </p:sp>
-      <p:pic>
-        <p:nvPicPr>
-          <p:cNvPr id="63" name="Picture 62">
-            <a:extLst>
-              <a:ext uri="{FF2B5EF4-FFF2-40B4-BE49-F238E27FC236}">
-                <a16:creationId xmlns:a16="http://schemas.microsoft.com/office/drawing/2014/main" id="{925F97C0-53E6-DA88-164C-35D9A424C49A}"/>
-              </a:ext>
-            </a:extLst>
-          </p:cNvPr>
-          <p:cNvPicPr>
-            <a:picLocks noChangeAspect="1"/>
-          </p:cNvPicPr>
-          <p:nvPr/>
-        </p:nvPicPr>
-        <p:blipFill>
-          <a:blip r:embed="rId2"/>
-          <a:stretch>
-            <a:fillRect/>
-          </a:stretch>
-        </p:blipFill>
-        <p:spPr>
-          <a:xfrm>
-            <a:off x="169711" y="3991544"/>
-            <a:ext cx="2796211" cy="760260"/>
-          </a:xfrm>
-          <a:prstGeom prst="rect">
-            <a:avLst/>
-          </a:prstGeom>
-        </p:spPr>
-      </p:pic>
       <p:sp>
         <p:nvSpPr>
           <p:cNvPr id="68" name="TextBox 67">
@@ -5786,7 +5765,7 @@
           <p:nvPr/>
         </p:nvPicPr>
         <p:blipFill>
-          <a:blip r:embed="rId3"/>
+          <a:blip r:embed="rId2"/>
           <a:stretch>
             <a:fillRect/>
           </a:stretch>
@@ -6628,6 +6607,413 @@
             <a:avLst/>
           </a:prstGeom>
           <a:ln>
+            <a:tailEnd type="triangle"/>
+          </a:ln>
+        </p:spPr>
+        <p:style>
+          <a:lnRef idx="1">
+            <a:schemeClr val="accent1"/>
+          </a:lnRef>
+          <a:fillRef idx="0">
+            <a:schemeClr val="accent1"/>
+          </a:fillRef>
+          <a:effectRef idx="0">
+            <a:schemeClr val="accent1"/>
+          </a:effectRef>
+          <a:fontRef idx="minor">
+            <a:schemeClr val="tx1"/>
+          </a:fontRef>
+        </p:style>
+      </p:cxnSp>
+      <p:sp>
+        <p:nvSpPr>
+          <p:cNvPr id="5" name="TextBox 4">
+            <a:extLst>
+              <a:ext uri="{FF2B5EF4-FFF2-40B4-BE49-F238E27FC236}">
+                <a16:creationId xmlns:a16="http://schemas.microsoft.com/office/drawing/2014/main" id="{B6FF1880-F976-3622-1798-54395A5A331B}"/>
+              </a:ext>
+            </a:extLst>
+          </p:cNvPr>
+          <p:cNvSpPr txBox="1"/>
+          <p:nvPr/>
+        </p:nvSpPr>
+        <p:spPr>
+          <a:xfrm>
+            <a:off x="249044" y="4468965"/>
+            <a:ext cx="2596640" cy="1189515"/>
+          </a:xfrm>
+          <a:prstGeom prst="rect">
+            <a:avLst/>
+          </a:prstGeom>
+          <a:solidFill>
+            <a:schemeClr val="bg1">
+              <a:lumMod val="85000"/>
+            </a:schemeClr>
+          </a:solidFill>
+          <a:ln>
+            <a:solidFill>
+              <a:schemeClr val="tx1"/>
+            </a:solidFill>
+          </a:ln>
+          <a:effectLst>
+            <a:outerShdw blurRad="50800" dist="38100" dir="2700000" algn="tl" rotWithShape="0">
+              <a:prstClr val="black">
+                <a:alpha val="40000"/>
+              </a:prstClr>
+            </a:outerShdw>
+          </a:effectLst>
+        </p:spPr>
+        <p:txBody>
+          <a:bodyPr wrap="none" rtlCol="0" anchor="t" anchorCtr="1">
+            <a:noAutofit/>
+          </a:bodyPr>
+          <a:lstStyle>
+            <a:defPPr>
+              <a:defRPr lang="en-NL"/>
+            </a:defPPr>
+          </a:lstStyle>
+          <a:p>
+            <a:r>
+              <a:rPr lang="en-NL" dirty="0"/>
+              <a:t>CartItem</a:t>
+            </a:r>
+          </a:p>
+        </p:txBody>
+      </p:sp>
+      <p:cxnSp>
+        <p:nvCxnSpPr>
+          <p:cNvPr id="6" name="Straight Arrow Connector 5">
+            <a:extLst>
+              <a:ext uri="{FF2B5EF4-FFF2-40B4-BE49-F238E27FC236}">
+                <a16:creationId xmlns:a16="http://schemas.microsoft.com/office/drawing/2014/main" id="{301D0E8C-5142-6FD1-E48C-7FEB9F70124D}"/>
+              </a:ext>
+            </a:extLst>
+          </p:cNvPr>
+          <p:cNvCxnSpPr>
+            <a:cxnSpLocks/>
+          </p:cNvCxnSpPr>
+          <p:nvPr/>
+        </p:nvCxnSpPr>
+        <p:spPr>
+          <a:xfrm>
+            <a:off x="1698409" y="3807813"/>
+            <a:ext cx="0" cy="658724"/>
+          </a:xfrm>
+          <a:prstGeom prst="straightConnector1">
+            <a:avLst/>
+          </a:prstGeom>
+          <a:ln>
+            <a:tailEnd type="triangle"/>
+          </a:ln>
+        </p:spPr>
+        <p:style>
+          <a:lnRef idx="1">
+            <a:schemeClr val="accent1"/>
+          </a:lnRef>
+          <a:fillRef idx="0">
+            <a:schemeClr val="accent1"/>
+          </a:fillRef>
+          <a:effectRef idx="0">
+            <a:schemeClr val="accent1"/>
+          </a:effectRef>
+          <a:fontRef idx="minor">
+            <a:schemeClr val="tx1"/>
+          </a:fontRef>
+        </p:style>
+      </p:cxnSp>
+      <p:sp>
+        <p:nvSpPr>
+          <p:cNvPr id="8" name="TextBox 7">
+            <a:extLst>
+              <a:ext uri="{FF2B5EF4-FFF2-40B4-BE49-F238E27FC236}">
+                <a16:creationId xmlns:a16="http://schemas.microsoft.com/office/drawing/2014/main" id="{9C4EB599-FE73-B65C-18B7-92F75037BEB9}"/>
+              </a:ext>
+            </a:extLst>
+          </p:cNvPr>
+          <p:cNvSpPr txBox="1"/>
+          <p:nvPr/>
+        </p:nvSpPr>
+        <p:spPr>
+          <a:xfrm>
+            <a:off x="125702" y="3955738"/>
+            <a:ext cx="3145413" cy="553998"/>
+          </a:xfrm>
+          <a:prstGeom prst="rect">
+            <a:avLst/>
+          </a:prstGeom>
+          <a:noFill/>
+        </p:spPr>
+        <p:txBody>
+          <a:bodyPr wrap="none" rtlCol="0">
+            <a:spAutoFit/>
+          </a:bodyPr>
+          <a:lstStyle>
+            <a:defPPr>
+              <a:defRPr lang="en-NL"/>
+            </a:defPPr>
+            <a:lvl1pPr>
+              <a:defRPr sz="1000">
+                <a:solidFill>
+                  <a:schemeClr val="accent5"/>
+                </a:solidFill>
+              </a:defRPr>
+            </a:lvl1pPr>
+          </a:lstStyle>
+          <a:p>
+            <a:r>
+              <a:rPr lang="en-NL" dirty="0"/>
+              <a:t>onRemove</a:t>
+            </a:r>
+            <a:r>
+              <a:rPr lang="en-GB" dirty="0">
+                <a:solidFill>
+                  <a:srgbClr val="569CD6"/>
+                </a:solidFill>
+                <a:latin typeface="Menlo" panose="020B0609030804020204" pitchFamily="49" charset="0"/>
+              </a:rPr>
+              <a:t>=</a:t>
+            </a:r>
+            <a:r>
+              <a:rPr lang="en-GB" dirty="0"/>
+              <a:t>{</a:t>
+            </a:r>
+            <a:r>
+              <a:rPr lang="en-GB" dirty="0" err="1"/>
+              <a:t>cartItemRemoveHandler.bind</a:t>
+            </a:r>
+            <a:r>
+              <a:rPr lang="en-GB" dirty="0"/>
+              <a:t>(null, </a:t>
+            </a:r>
+            <a:r>
+              <a:rPr lang="en-GB" dirty="0" err="1"/>
+              <a:t>item.id</a:t>
+            </a:r>
+            <a:r>
+              <a:rPr lang="en-GB" dirty="0"/>
+              <a:t>)}</a:t>
+            </a:r>
+          </a:p>
+          <a:p>
+            <a:r>
+              <a:rPr lang="en-GB" dirty="0" err="1"/>
+              <a:t>onAdd</a:t>
+            </a:r>
+            <a:r>
+              <a:rPr lang="en-GB" dirty="0"/>
+              <a:t>={</a:t>
+            </a:r>
+            <a:r>
+              <a:rPr lang="en-GB" dirty="0" err="1"/>
+              <a:t>cartItemAddHandler.bind</a:t>
+            </a:r>
+            <a:r>
+              <a:rPr lang="en-GB" dirty="0"/>
+              <a:t>(null, item)}</a:t>
+            </a:r>
+          </a:p>
+          <a:p>
+            <a:endParaRPr lang="en-NL" dirty="0"/>
+          </a:p>
+        </p:txBody>
+      </p:sp>
+      <p:cxnSp>
+        <p:nvCxnSpPr>
+          <p:cNvPr id="7" name="Straight Arrow Connector 6">
+            <a:extLst>
+              <a:ext uri="{FF2B5EF4-FFF2-40B4-BE49-F238E27FC236}">
+                <a16:creationId xmlns:a16="http://schemas.microsoft.com/office/drawing/2014/main" id="{F81CC47E-4ECE-3B5B-85B2-C4692ACB61F1}"/>
+              </a:ext>
+            </a:extLst>
+          </p:cNvPr>
+          <p:cNvCxnSpPr>
+            <a:cxnSpLocks/>
+          </p:cNvCxnSpPr>
+          <p:nvPr/>
+        </p:nvCxnSpPr>
+        <p:spPr>
+          <a:xfrm flipH="1" flipV="1">
+            <a:off x="1021380" y="2605019"/>
+            <a:ext cx="187385" cy="167594"/>
+          </a:xfrm>
+          <a:prstGeom prst="straightConnector1">
+            <a:avLst/>
+          </a:prstGeom>
+          <a:ln>
+            <a:solidFill>
+              <a:srgbClr val="7030A0"/>
+            </a:solidFill>
+            <a:tailEnd type="triangle"/>
+          </a:ln>
+        </p:spPr>
+        <p:style>
+          <a:lnRef idx="1">
+            <a:schemeClr val="accent1"/>
+          </a:lnRef>
+          <a:fillRef idx="0">
+            <a:schemeClr val="accent1"/>
+          </a:fillRef>
+          <a:effectRef idx="0">
+            <a:schemeClr val="accent1"/>
+          </a:effectRef>
+          <a:fontRef idx="minor">
+            <a:schemeClr val="tx1"/>
+          </a:fontRef>
+        </p:style>
+      </p:cxnSp>
+      <p:cxnSp>
+        <p:nvCxnSpPr>
+          <p:cNvPr id="12" name="Straight Arrow Connector 11">
+            <a:extLst>
+              <a:ext uri="{FF2B5EF4-FFF2-40B4-BE49-F238E27FC236}">
+                <a16:creationId xmlns:a16="http://schemas.microsoft.com/office/drawing/2014/main" id="{2939513B-AD41-6AB6-EE47-20551B30F561}"/>
+              </a:ext>
+            </a:extLst>
+          </p:cNvPr>
+          <p:cNvCxnSpPr>
+            <a:cxnSpLocks/>
+            <a:stCxn id="77" idx="1"/>
+          </p:cNvCxnSpPr>
+          <p:nvPr/>
+        </p:nvCxnSpPr>
+        <p:spPr>
+          <a:xfrm flipH="1" flipV="1">
+            <a:off x="782691" y="2605019"/>
+            <a:ext cx="460373" cy="579949"/>
+          </a:xfrm>
+          <a:prstGeom prst="straightConnector1">
+            <a:avLst/>
+          </a:prstGeom>
+          <a:ln>
+            <a:solidFill>
+              <a:srgbClr val="7030A0"/>
+            </a:solidFill>
+            <a:tailEnd type="triangle"/>
+          </a:ln>
+        </p:spPr>
+        <p:style>
+          <a:lnRef idx="1">
+            <a:schemeClr val="accent1"/>
+          </a:lnRef>
+          <a:fillRef idx="0">
+            <a:schemeClr val="accent1"/>
+          </a:fillRef>
+          <a:effectRef idx="0">
+            <a:schemeClr val="accent1"/>
+          </a:effectRef>
+          <a:fontRef idx="minor">
+            <a:schemeClr val="tx1"/>
+          </a:fontRef>
+        </p:style>
+      </p:cxnSp>
+      <p:pic>
+        <p:nvPicPr>
+          <p:cNvPr id="16" name="Picture 15">
+            <a:extLst>
+              <a:ext uri="{FF2B5EF4-FFF2-40B4-BE49-F238E27FC236}">
+                <a16:creationId xmlns:a16="http://schemas.microsoft.com/office/drawing/2014/main" id="{3BC74ACD-48CC-7DBE-C55B-5C65538A2DC8}"/>
+              </a:ext>
+            </a:extLst>
+          </p:cNvPr>
+          <p:cNvPicPr>
+            <a:picLocks noChangeAspect="1"/>
+          </p:cNvPicPr>
+          <p:nvPr/>
+        </p:nvPicPr>
+        <p:blipFill>
+          <a:blip r:embed="rId3"/>
+          <a:stretch>
+            <a:fillRect/>
+          </a:stretch>
+        </p:blipFill>
+        <p:spPr>
+          <a:xfrm>
+            <a:off x="526133" y="5219247"/>
+            <a:ext cx="1801274" cy="1350264"/>
+          </a:xfrm>
+          <a:prstGeom prst="rect">
+            <a:avLst/>
+          </a:prstGeom>
+        </p:spPr>
+      </p:pic>
+      <p:cxnSp>
+        <p:nvCxnSpPr>
+          <p:cNvPr id="19" name="Elbow Connector 18">
+            <a:extLst>
+              <a:ext uri="{FF2B5EF4-FFF2-40B4-BE49-F238E27FC236}">
+                <a16:creationId xmlns:a16="http://schemas.microsoft.com/office/drawing/2014/main" id="{0D86564A-40C6-5AE6-3ECA-19F0572ADF55}"/>
+              </a:ext>
+            </a:extLst>
+          </p:cNvPr>
+          <p:cNvCxnSpPr>
+            <a:cxnSpLocks/>
+            <a:endCxn id="77" idx="3"/>
+          </p:cNvCxnSpPr>
+          <p:nvPr/>
+        </p:nvCxnSpPr>
+        <p:spPr>
+          <a:xfrm rot="5400000" flipH="1" flipV="1">
+            <a:off x="1168745" y="4162329"/>
+            <a:ext cx="2303946" cy="349224"/>
+          </a:xfrm>
+          <a:prstGeom prst="bentConnector4">
+            <a:avLst>
+              <a:gd name="adj1" fmla="val 64663"/>
+              <a:gd name="adj2" fmla="val 165459"/>
+            </a:avLst>
+          </a:prstGeom>
+          <a:ln>
+            <a:solidFill>
+              <a:srgbClr val="7030A0"/>
+            </a:solidFill>
+            <a:tailEnd type="triangle"/>
+          </a:ln>
+        </p:spPr>
+        <p:style>
+          <a:lnRef idx="1">
+            <a:schemeClr val="accent1"/>
+          </a:lnRef>
+          <a:fillRef idx="0">
+            <a:schemeClr val="accent1"/>
+          </a:fillRef>
+          <a:effectRef idx="0">
+            <a:schemeClr val="accent1"/>
+          </a:effectRef>
+          <a:fontRef idx="minor">
+            <a:schemeClr val="tx1"/>
+          </a:fontRef>
+        </p:style>
+      </p:cxnSp>
+      <p:cxnSp>
+        <p:nvCxnSpPr>
+          <p:cNvPr id="21" name="Elbow Connector 20">
+            <a:extLst>
+              <a:ext uri="{FF2B5EF4-FFF2-40B4-BE49-F238E27FC236}">
+                <a16:creationId xmlns:a16="http://schemas.microsoft.com/office/drawing/2014/main" id="{BD4EA92F-593C-1627-1DFF-B08B0AFAF970}"/>
+              </a:ext>
+            </a:extLst>
+          </p:cNvPr>
+          <p:cNvCxnSpPr>
+            <a:cxnSpLocks/>
+            <a:endCxn id="76" idx="3"/>
+          </p:cNvCxnSpPr>
+          <p:nvPr/>
+        </p:nvCxnSpPr>
+        <p:spPr>
+          <a:xfrm rot="5400000" flipH="1" flipV="1">
+            <a:off x="1044276" y="3754550"/>
+            <a:ext cx="2584924" cy="749996"/>
+          </a:xfrm>
+          <a:prstGeom prst="bentConnector4">
+            <a:avLst>
+              <a:gd name="adj1" fmla="val 47619"/>
+              <a:gd name="adj2" fmla="val 130480"/>
+            </a:avLst>
+          </a:prstGeom>
+          <a:ln>
+            <a:solidFill>
+              <a:srgbClr val="7030A0"/>
+            </a:solidFill>
             <a:tailEnd type="triangle"/>
           </a:ln>
         </p:spPr>

</xml_diff>

<commit_message>
Updated Software Architecture PPT
</commit_message>
<xml_diff>
--- a/Software Architecture.pptx
+++ b/Software Architecture.pptx
@@ -4419,8 +4419,8 @@
         </p:nvSpPr>
         <p:spPr>
           <a:xfrm>
-            <a:off x="1243064" y="2713975"/>
-            <a:ext cx="1800493" cy="246221"/>
+            <a:off x="1243065" y="2713976"/>
+            <a:ext cx="1492421" cy="246221"/>
           </a:xfrm>
           <a:prstGeom prst="rect">
             <a:avLst/>
@@ -4438,7 +4438,7 @@
           </a:ln>
         </p:spPr>
         <p:txBody>
-          <a:bodyPr wrap="none" rtlCol="0">
+          <a:bodyPr wrap="square" rtlCol="0">
             <a:spAutoFit/>
           </a:bodyPr>
           <a:lstStyle>
@@ -6201,7 +6201,7 @@
           </a:xfrm>
           <a:prstGeom prst="bentConnector3">
             <a:avLst>
-              <a:gd name="adj1" fmla="val -181691"/>
+              <a:gd name="adj1" fmla="val -457361"/>
             </a:avLst>
           </a:prstGeom>
           <a:ln>
@@ -6828,13 +6828,14 @@
           </p:cNvPr>
           <p:cNvCxnSpPr>
             <a:cxnSpLocks/>
+            <a:endCxn id="55" idx="1"/>
           </p:cNvCxnSpPr>
           <p:nvPr/>
         </p:nvCxnSpPr>
         <p:spPr>
-          <a:xfrm flipH="1" flipV="1">
-            <a:off x="1021380" y="2605019"/>
-            <a:ext cx="187385" cy="167594"/>
+          <a:xfrm flipV="1">
+            <a:off x="3026269" y="1104819"/>
+            <a:ext cx="3937898" cy="1687777"/>
           </a:xfrm>
           <a:prstGeom prst="straightConnector1">
             <a:avLst/>
@@ -6872,14 +6873,14 @@
           </p:cNvPr>
           <p:cNvCxnSpPr>
             <a:cxnSpLocks/>
-            <a:stCxn id="77" idx="1"/>
+            <a:endCxn id="54" idx="1"/>
           </p:cNvCxnSpPr>
           <p:nvPr/>
         </p:nvCxnSpPr>
         <p:spPr>
-          <a:xfrm flipH="1" flipV="1">
-            <a:off x="782691" y="2605019"/>
-            <a:ext cx="460373" cy="579949"/>
+          <a:xfrm flipV="1">
+            <a:off x="2515621" y="812323"/>
+            <a:ext cx="4442413" cy="2404342"/>
           </a:xfrm>
           <a:prstGeom prst="straightConnector1">
             <a:avLst/>
@@ -7001,14 +7002,60 @@
         </p:nvCxnSpPr>
         <p:spPr>
           <a:xfrm rot="5400000" flipH="1" flipV="1">
-            <a:off x="1044276" y="3754550"/>
-            <a:ext cx="2584924" cy="749996"/>
+            <a:off x="1056150" y="3742675"/>
+            <a:ext cx="2584924" cy="773748"/>
           </a:xfrm>
           <a:prstGeom prst="bentConnector4">
             <a:avLst>
               <a:gd name="adj1" fmla="val 47619"/>
-              <a:gd name="adj2" fmla="val 130480"/>
+              <a:gd name="adj2" fmla="val 129545"/>
             </a:avLst>
+          </a:prstGeom>
+          <a:ln>
+            <a:solidFill>
+              <a:srgbClr val="7030A0"/>
+            </a:solidFill>
+            <a:tailEnd type="triangle"/>
+          </a:ln>
+        </p:spPr>
+        <p:style>
+          <a:lnRef idx="1">
+            <a:schemeClr val="accent1"/>
+          </a:lnRef>
+          <a:fillRef idx="0">
+            <a:schemeClr val="accent1"/>
+          </a:fillRef>
+          <a:effectRef idx="0">
+            <a:schemeClr val="accent1"/>
+          </a:effectRef>
+          <a:fontRef idx="minor">
+            <a:schemeClr val="tx1"/>
+          </a:fontRef>
+        </p:style>
+      </p:cxnSp>
+      <p:cxnSp>
+        <p:nvCxnSpPr>
+          <p:cNvPr id="13" name="Straight Arrow Connector 12">
+            <a:extLst>
+              <a:ext uri="{FF2B5EF4-FFF2-40B4-BE49-F238E27FC236}">
+                <a16:creationId xmlns:a16="http://schemas.microsoft.com/office/drawing/2014/main" id="{1CA079EB-2A75-4AF7-8854-FCFF124F415B}"/>
+              </a:ext>
+            </a:extLst>
+          </p:cNvPr>
+          <p:cNvCxnSpPr>
+            <a:cxnSpLocks/>
+            <a:stCxn id="204" idx="1"/>
+            <a:endCxn id="54" idx="3"/>
+          </p:cNvCxnSpPr>
+          <p:nvPr/>
+        </p:nvCxnSpPr>
+        <p:spPr>
+          <a:xfrm flipH="1" flipV="1">
+            <a:off x="7580320" y="812323"/>
+            <a:ext cx="1594461" cy="3818553"/>
+          </a:xfrm>
+          <a:prstGeom prst="straightConnector1">
+            <a:avLst/>
           </a:prstGeom>
           <a:ln>
             <a:solidFill>

</xml_diff>